<commit_message>
Update theo ý kiến thầy
</commit_message>
<xml_diff>
--- a/doc/report.pptx
+++ b/doc/report.pptx
@@ -17406,7 +17406,7 @@
                 <a:latin typeface="Arial" panose="020B0604020202020204" pitchFamily="34" charset="0"/>
                 <a:cs typeface="Arial" panose="020B0604020202020204" pitchFamily="34" charset="0"/>
               </a:rPr>
-              <a:t>biệc</a:t>
+              <a:t>biệt</a:t>
             </a:r>
             <a:r>
               <a:rPr lang="en-US" sz="1800" dirty="0">
@@ -19161,7 +19161,7 @@
           <p:nvPr>
             <p:extLst>
               <p:ext uri="{D42A27DB-BD31-4B8C-83A1-F6EECF244321}">
-                <p14:modId xmlns:p14="http://schemas.microsoft.com/office/powerpoint/2010/main" val="329985106"/>
+                <p14:modId xmlns:p14="http://schemas.microsoft.com/office/powerpoint/2010/main" val="1336904682"/>
               </p:ext>
             </p:extLst>
           </p:nvPr>
@@ -19218,20 +19218,8 @@
                     <a:p>
                       <a:pPr algn="ctr"/>
                       <a:r>
-                        <a:rPr lang="en-US" dirty="0" err="1"/>
-                        <a:t>Độ</a:t>
-                      </a:r>
-                      <a:r>
                         <a:rPr lang="en-US" dirty="0"/>
-                        <a:t> </a:t>
-                      </a:r>
-                      <a:r>
-                        <a:rPr lang="en-US" dirty="0" err="1"/>
-                        <a:t>lỗi</a:t>
-                      </a:r>
-                      <a:r>
-                        <a:rPr lang="en-US" dirty="0"/>
-                        <a:t> </a:t>
+                        <a:t>Score </a:t>
                       </a:r>
                       <a:r>
                         <a:rPr lang="en-US" dirty="0" err="1"/>
@@ -19260,20 +19248,8 @@
                     <a:p>
                       <a:pPr algn="ctr"/>
                       <a:r>
-                        <a:rPr lang="en-US" dirty="0" err="1"/>
-                        <a:t>Độ</a:t>
-                      </a:r>
-                      <a:r>
                         <a:rPr lang="en-US" dirty="0"/>
-                        <a:t> </a:t>
-                      </a:r>
-                      <a:r>
-                        <a:rPr lang="en-US" dirty="0" err="1"/>
-                        <a:t>lỗi</a:t>
-                      </a:r>
-                      <a:r>
-                        <a:rPr lang="en-US" dirty="0"/>
-                        <a:t> </a:t>
+                        <a:t>Score </a:t>
                       </a:r>
                       <a:r>
                         <a:rPr lang="en-US" dirty="0" err="1"/>
@@ -19324,7 +19300,7 @@
                       <a:pPr algn="ctr"/>
                       <a:r>
                         <a:rPr lang="en-US" dirty="0"/>
-                        <a:t>94.82</a:t>
+                        <a:t>0.0518</a:t>
                       </a:r>
                     </a:p>
                   </a:txBody>
@@ -19338,7 +19314,7 @@
                       <a:pPr algn="ctr"/>
                       <a:r>
                         <a:rPr lang="en-US" dirty="0"/>
-                        <a:t>94.99</a:t>
+                        <a:t>0.0501</a:t>
                       </a:r>
                     </a:p>
                   </a:txBody>
@@ -19373,7 +19349,7 @@
                       <a:pPr algn="ctr"/>
                       <a:r>
                         <a:rPr lang="en-US" dirty="0"/>
-                        <a:t>10.04</a:t>
+                        <a:t>0.8996</a:t>
                       </a:r>
                     </a:p>
                   </a:txBody>
@@ -19387,7 +19363,7 @@
                       <a:pPr algn="ctr"/>
                       <a:r>
                         <a:rPr lang="en-US" dirty="0"/>
-                        <a:t>71.08</a:t>
+                        <a:t>0.2892</a:t>
                       </a:r>
                     </a:p>
                   </a:txBody>
@@ -19866,7 +19842,7 @@
         <p:spPr>
           <a:xfrm>
             <a:off x="4654296" y="0"/>
-            <a:ext cx="7078531" cy="6303981"/>
+            <a:ext cx="7706240" cy="7089289"/>
           </a:xfrm>
         </p:spPr>
         <p:txBody>
@@ -21311,20 +21287,6 @@
                 <a:cs typeface="Arial" panose="020B0604020202020204" pitchFamily="34" charset="0"/>
               </a:rPr>
               <a:t>rằng</a:t>
-            </a:r>
-            <a:r>
-              <a:rPr lang="en-US" sz="1600" dirty="0">
-                <a:latin typeface="Arial" panose="020B0604020202020204" pitchFamily="34" charset="0"/>
-                <a:cs typeface="Arial" panose="020B0604020202020204" pitchFamily="34" charset="0"/>
-              </a:rPr>
-              <a:t> </a:t>
-            </a:r>
-            <a:r>
-              <a:rPr lang="en-US" sz="1600" dirty="0" err="1">
-                <a:latin typeface="Arial" panose="020B0604020202020204" pitchFamily="34" charset="0"/>
-                <a:cs typeface="Arial" panose="020B0604020202020204" pitchFamily="34" charset="0"/>
-              </a:rPr>
-              <a:t>phần</a:t>
             </a:r>
             <a:r>
               <a:rPr lang="en-US" sz="1600" dirty="0">

</xml_diff>